<commit_message>
Translated and updated Intro slides.
</commit_message>
<xml_diff>
--- a/slides/Java 8 - Lambda Intro + Functional Interfaces.pptx
+++ b/slides/Java 8 - Lambda Intro + Functional Interfaces.pptx
@@ -96,7 +96,7 @@
         <p:spPr>
           <a:xfrm>
             <a:off x="457200" y="1604520"/>
-            <a:ext cx="8046360" cy="1896840"/>
+            <a:ext cx="8229240" cy="1896840"/>
           </a:xfrm>
           <a:prstGeom prst="rect">
             <a:avLst/>
@@ -122,7 +122,7 @@
         <p:spPr>
           <a:xfrm>
             <a:off x="457200" y="3681720"/>
-            <a:ext cx="8046360" cy="1896840"/>
+            <a:ext cx="8229240" cy="1896840"/>
           </a:xfrm>
           <a:prstGeom prst="rect">
             <a:avLst/>
@@ -197,7 +197,7 @@
         <p:spPr>
           <a:xfrm>
             <a:off x="457200" y="1604520"/>
-            <a:ext cx="3926160" cy="1896840"/>
+            <a:ext cx="4015440" cy="1896840"/>
           </a:xfrm>
           <a:prstGeom prst="rect">
             <a:avLst/>
@@ -222,8 +222,8 @@
         </p:nvSpPr>
         <p:spPr>
           <a:xfrm>
-            <a:off x="4579920" y="1604520"/>
-            <a:ext cx="3926160" cy="1896840"/>
+            <a:off x="4673520" y="1604520"/>
+            <a:ext cx="4015440" cy="1896840"/>
           </a:xfrm>
           <a:prstGeom prst="rect">
             <a:avLst/>
@@ -248,8 +248,8 @@
         </p:nvSpPr>
         <p:spPr>
           <a:xfrm>
-            <a:off x="4579920" y="3681720"/>
-            <a:ext cx="3926160" cy="1896840"/>
+            <a:off x="4673520" y="3681720"/>
+            <a:ext cx="4015440" cy="1896840"/>
           </a:xfrm>
           <a:prstGeom prst="rect">
             <a:avLst/>
@@ -275,7 +275,7 @@
         <p:spPr>
           <a:xfrm>
             <a:off x="457200" y="3681720"/>
-            <a:ext cx="3926160" cy="1896840"/>
+            <a:ext cx="4015440" cy="1896840"/>
           </a:xfrm>
           <a:prstGeom prst="rect">
             <a:avLst/>
@@ -350,7 +350,7 @@
         <p:spPr>
           <a:xfrm>
             <a:off x="457200" y="1604520"/>
-            <a:ext cx="3926160" cy="1896840"/>
+            <a:ext cx="4015440" cy="1896840"/>
           </a:xfrm>
           <a:prstGeom prst="rect">
             <a:avLst/>
@@ -375,8 +375,8 @@
         </p:nvSpPr>
         <p:spPr>
           <a:xfrm>
-            <a:off x="4579920" y="1604520"/>
-            <a:ext cx="3926160" cy="1896840"/>
+            <a:off x="4673520" y="1604520"/>
+            <a:ext cx="4015440" cy="1896840"/>
           </a:xfrm>
           <a:prstGeom prst="rect">
             <a:avLst/>
@@ -389,6 +389,56 @@
           </a:p>
         </p:txBody>
       </p:sp>
+      <p:pic>
+        <p:nvPicPr>
+          <p:cNvPr descr="" id="40" name=""/>
+          <p:cNvPicPr/>
+          <p:nvPr/>
+        </p:nvPicPr>
+        <p:blipFill>
+          <a:blip r:embed="rId2"/>
+          <a:stretch>
+            <a:fillRect/>
+          </a:stretch>
+        </p:blipFill>
+        <p:spPr>
+          <a:xfrm>
+            <a:off x="5492520" y="3681360"/>
+            <a:ext cx="2377440" cy="1896840"/>
+          </a:xfrm>
+          <a:prstGeom prst="rect">
+            <a:avLst/>
+          </a:prstGeom>
+          <a:ln>
+            <a:noFill/>
+          </a:ln>
+        </p:spPr>
+      </p:pic>
+      <p:pic>
+        <p:nvPicPr>
+          <p:cNvPr descr="" id="41" name=""/>
+          <p:cNvPicPr/>
+          <p:nvPr/>
+        </p:nvPicPr>
+        <p:blipFill>
+          <a:blip r:embed="rId3"/>
+          <a:stretch>
+            <a:fillRect/>
+          </a:stretch>
+        </p:blipFill>
+        <p:spPr>
+          <a:xfrm>
+            <a:off x="1276200" y="3681360"/>
+            <a:ext cx="2377440" cy="1896840"/>
+          </a:xfrm>
+          <a:prstGeom prst="rect">
+            <a:avLst/>
+          </a:prstGeom>
+          <a:ln>
+            <a:noFill/>
+          </a:ln>
+        </p:spPr>
+      </p:pic>
     </p:spTree>
   </p:cSld>
 </p:sldLayout>
@@ -435,7 +485,7 @@
       </p:grpSpPr>
       <p:sp>
         <p:nvSpPr>
-          <p:cNvPr id="44" name="PlaceHolder 1"/>
+          <p:cNvPr id="46" name="PlaceHolder 1"/>
           <p:cNvSpPr>
             <a:spLocks noGrp="1"/>
           </p:cNvSpPr>
@@ -462,7 +512,7 @@
       </p:sp>
       <p:sp>
         <p:nvSpPr>
-          <p:cNvPr id="45" name="PlaceHolder 2"/>
+          <p:cNvPr id="47" name="PlaceHolder 2"/>
           <p:cNvSpPr>
             <a:spLocks noGrp="1"/>
           </p:cNvSpPr>
@@ -473,7 +523,7 @@
         <p:spPr>
           <a:xfrm>
             <a:off x="457200" y="1604520"/>
-            <a:ext cx="8046360" cy="3977640"/>
+            <a:ext cx="8229240" cy="3977640"/>
           </a:xfrm>
           <a:prstGeom prst="rect">
             <a:avLst/>
@@ -511,7 +561,7 @@
       </p:grpSpPr>
       <p:sp>
         <p:nvSpPr>
-          <p:cNvPr id="46" name="PlaceHolder 1"/>
+          <p:cNvPr id="48" name="PlaceHolder 1"/>
           <p:cNvSpPr>
             <a:spLocks noGrp="1"/>
           </p:cNvSpPr>
@@ -538,7 +588,7 @@
       </p:sp>
       <p:sp>
         <p:nvSpPr>
-          <p:cNvPr id="47" name="PlaceHolder 2"/>
+          <p:cNvPr id="49" name="PlaceHolder 2"/>
           <p:cNvSpPr>
             <a:spLocks noGrp="1"/>
           </p:cNvSpPr>
@@ -549,7 +599,7 @@
         <p:spPr>
           <a:xfrm>
             <a:off x="457200" y="1604520"/>
-            <a:ext cx="8046360" cy="3977280"/>
+            <a:ext cx="8229240" cy="3977280"/>
           </a:xfrm>
           <a:prstGeom prst="rect">
             <a:avLst/>
@@ -586,7 +636,7 @@
       </p:grpSpPr>
       <p:sp>
         <p:nvSpPr>
-          <p:cNvPr id="48" name="PlaceHolder 1"/>
+          <p:cNvPr id="50" name="PlaceHolder 1"/>
           <p:cNvSpPr>
             <a:spLocks noGrp="1"/>
           </p:cNvSpPr>
@@ -613,7 +663,7 @@
       </p:sp>
       <p:sp>
         <p:nvSpPr>
-          <p:cNvPr id="49" name="PlaceHolder 2"/>
+          <p:cNvPr id="51" name="PlaceHolder 2"/>
           <p:cNvSpPr>
             <a:spLocks noGrp="1"/>
           </p:cNvSpPr>
@@ -624,7 +674,7 @@
         <p:spPr>
           <a:xfrm>
             <a:off x="457200" y="1604520"/>
-            <a:ext cx="3926160" cy="3977280"/>
+            <a:ext cx="4015440" cy="3977280"/>
           </a:xfrm>
           <a:prstGeom prst="rect">
             <a:avLst/>
@@ -639,7 +689,7 @@
       </p:sp>
       <p:sp>
         <p:nvSpPr>
-          <p:cNvPr id="50" name="PlaceHolder 3"/>
+          <p:cNvPr id="52" name="PlaceHolder 3"/>
           <p:cNvSpPr>
             <a:spLocks noGrp="1"/>
           </p:cNvSpPr>
@@ -649,8 +699,8 @@
         </p:nvSpPr>
         <p:spPr>
           <a:xfrm>
-            <a:off x="4579920" y="1604520"/>
-            <a:ext cx="3926160" cy="3977280"/>
+            <a:off x="4673520" y="1604520"/>
+            <a:ext cx="4015440" cy="3977280"/>
           </a:xfrm>
           <a:prstGeom prst="rect">
             <a:avLst/>
@@ -687,7 +737,7 @@
       </p:grpSpPr>
       <p:sp>
         <p:nvSpPr>
-          <p:cNvPr id="51" name="PlaceHolder 1"/>
+          <p:cNvPr id="53" name="PlaceHolder 1"/>
           <p:cNvSpPr>
             <a:spLocks noGrp="1"/>
           </p:cNvSpPr>
@@ -736,7 +786,7 @@
       </p:grpSpPr>
       <p:sp>
         <p:nvSpPr>
-          <p:cNvPr id="52" name="PlaceHolder 1"/>
+          <p:cNvPr id="54" name="PlaceHolder 1"/>
           <p:cNvSpPr>
             <a:spLocks noGrp="1"/>
           </p:cNvSpPr>
@@ -785,7 +835,7 @@
       </p:grpSpPr>
       <p:sp>
         <p:nvSpPr>
-          <p:cNvPr id="53" name="PlaceHolder 1"/>
+          <p:cNvPr id="55" name="PlaceHolder 1"/>
           <p:cNvSpPr>
             <a:spLocks noGrp="1"/>
           </p:cNvSpPr>
@@ -812,7 +862,7 @@
       </p:sp>
       <p:sp>
         <p:nvSpPr>
-          <p:cNvPr id="54" name="PlaceHolder 2"/>
+          <p:cNvPr id="56" name="PlaceHolder 2"/>
           <p:cNvSpPr>
             <a:spLocks noGrp="1"/>
           </p:cNvSpPr>
@@ -823,7 +873,7 @@
         <p:spPr>
           <a:xfrm>
             <a:off x="457200" y="1604520"/>
-            <a:ext cx="3926160" cy="1896840"/>
+            <a:ext cx="4015440" cy="1896840"/>
           </a:xfrm>
           <a:prstGeom prst="rect">
             <a:avLst/>
@@ -838,7 +888,7 @@
       </p:sp>
       <p:sp>
         <p:nvSpPr>
-          <p:cNvPr id="55" name="PlaceHolder 3"/>
+          <p:cNvPr id="57" name="PlaceHolder 3"/>
           <p:cNvSpPr>
             <a:spLocks noGrp="1"/>
           </p:cNvSpPr>
@@ -849,7 +899,7 @@
         <p:spPr>
           <a:xfrm>
             <a:off x="457200" y="3681720"/>
-            <a:ext cx="3926160" cy="1896840"/>
+            <a:ext cx="4015440" cy="1896840"/>
           </a:xfrm>
           <a:prstGeom prst="rect">
             <a:avLst/>
@@ -864,7 +914,7 @@
       </p:sp>
       <p:sp>
         <p:nvSpPr>
-          <p:cNvPr id="56" name="PlaceHolder 4"/>
+          <p:cNvPr id="58" name="PlaceHolder 4"/>
           <p:cNvSpPr>
             <a:spLocks noGrp="1"/>
           </p:cNvSpPr>
@@ -874,8 +924,8 @@
         </p:nvSpPr>
         <p:spPr>
           <a:xfrm>
-            <a:off x="4579920" y="1604520"/>
-            <a:ext cx="3926160" cy="3977280"/>
+            <a:off x="4673520" y="1604520"/>
+            <a:ext cx="4015440" cy="3977280"/>
           </a:xfrm>
           <a:prstGeom prst="rect">
             <a:avLst/>
@@ -950,7 +1000,7 @@
         <p:spPr>
           <a:xfrm>
             <a:off x="457200" y="1604520"/>
-            <a:ext cx="8046360" cy="3977640"/>
+            <a:ext cx="8229240" cy="3977640"/>
           </a:xfrm>
           <a:prstGeom prst="rect">
             <a:avLst/>
@@ -988,7 +1038,7 @@
       </p:grpSpPr>
       <p:sp>
         <p:nvSpPr>
-          <p:cNvPr id="57" name="PlaceHolder 1"/>
+          <p:cNvPr id="59" name="PlaceHolder 1"/>
           <p:cNvSpPr>
             <a:spLocks noGrp="1"/>
           </p:cNvSpPr>
@@ -1015,7 +1065,7 @@
       </p:sp>
       <p:sp>
         <p:nvSpPr>
-          <p:cNvPr id="58" name="PlaceHolder 2"/>
+          <p:cNvPr id="60" name="PlaceHolder 2"/>
           <p:cNvSpPr>
             <a:spLocks noGrp="1"/>
           </p:cNvSpPr>
@@ -1026,7 +1076,7 @@
         <p:spPr>
           <a:xfrm>
             <a:off x="457200" y="1604520"/>
-            <a:ext cx="3926160" cy="3977280"/>
+            <a:ext cx="4015440" cy="3977280"/>
           </a:xfrm>
           <a:prstGeom prst="rect">
             <a:avLst/>
@@ -1041,7 +1091,7 @@
       </p:sp>
       <p:sp>
         <p:nvSpPr>
-          <p:cNvPr id="59" name="PlaceHolder 3"/>
+          <p:cNvPr id="61" name="PlaceHolder 3"/>
           <p:cNvSpPr>
             <a:spLocks noGrp="1"/>
           </p:cNvSpPr>
@@ -1051,8 +1101,8 @@
         </p:nvSpPr>
         <p:spPr>
           <a:xfrm>
-            <a:off x="4579920" y="1604520"/>
-            <a:ext cx="3926160" cy="1896840"/>
+            <a:off x="4673520" y="1604520"/>
+            <a:ext cx="4015440" cy="1896840"/>
           </a:xfrm>
           <a:prstGeom prst="rect">
             <a:avLst/>
@@ -1067,7 +1117,7 @@
       </p:sp>
       <p:sp>
         <p:nvSpPr>
-          <p:cNvPr id="60" name="PlaceHolder 4"/>
+          <p:cNvPr id="62" name="PlaceHolder 4"/>
           <p:cNvSpPr>
             <a:spLocks noGrp="1"/>
           </p:cNvSpPr>
@@ -1077,8 +1127,8 @@
         </p:nvSpPr>
         <p:spPr>
           <a:xfrm>
-            <a:off x="4579920" y="3681720"/>
-            <a:ext cx="3926160" cy="1896840"/>
+            <a:off x="4673520" y="3681720"/>
+            <a:ext cx="4015440" cy="1896840"/>
           </a:xfrm>
           <a:prstGeom prst="rect">
             <a:avLst/>
@@ -1115,7 +1165,7 @@
       </p:grpSpPr>
       <p:sp>
         <p:nvSpPr>
-          <p:cNvPr id="61" name="PlaceHolder 1"/>
+          <p:cNvPr id="63" name="PlaceHolder 1"/>
           <p:cNvSpPr>
             <a:spLocks noGrp="1"/>
           </p:cNvSpPr>
@@ -1142,7 +1192,7 @@
       </p:sp>
       <p:sp>
         <p:nvSpPr>
-          <p:cNvPr id="62" name="PlaceHolder 2"/>
+          <p:cNvPr id="64" name="PlaceHolder 2"/>
           <p:cNvSpPr>
             <a:spLocks noGrp="1"/>
           </p:cNvSpPr>
@@ -1153,7 +1203,7 @@
         <p:spPr>
           <a:xfrm>
             <a:off x="457200" y="1604520"/>
-            <a:ext cx="3926160" cy="1896840"/>
+            <a:ext cx="4015440" cy="1896840"/>
           </a:xfrm>
           <a:prstGeom prst="rect">
             <a:avLst/>
@@ -1168,7 +1218,7 @@
       </p:sp>
       <p:sp>
         <p:nvSpPr>
-          <p:cNvPr id="63" name="PlaceHolder 3"/>
+          <p:cNvPr id="65" name="PlaceHolder 3"/>
           <p:cNvSpPr>
             <a:spLocks noGrp="1"/>
           </p:cNvSpPr>
@@ -1178,8 +1228,8 @@
         </p:nvSpPr>
         <p:spPr>
           <a:xfrm>
-            <a:off x="4579920" y="1604520"/>
-            <a:ext cx="3926160" cy="1896840"/>
+            <a:off x="4673520" y="1604520"/>
+            <a:ext cx="4015440" cy="1896840"/>
           </a:xfrm>
           <a:prstGeom prst="rect">
             <a:avLst/>
@@ -1194,7 +1244,7 @@
       </p:sp>
       <p:sp>
         <p:nvSpPr>
-          <p:cNvPr id="64" name="PlaceHolder 4"/>
+          <p:cNvPr id="66" name="PlaceHolder 4"/>
           <p:cNvSpPr>
             <a:spLocks noGrp="1"/>
           </p:cNvSpPr>
@@ -1205,7 +1255,7 @@
         <p:spPr>
           <a:xfrm>
             <a:off x="457200" y="3681720"/>
-            <a:ext cx="8045640" cy="1896840"/>
+            <a:ext cx="8228520" cy="1896840"/>
           </a:xfrm>
           <a:prstGeom prst="rect">
             <a:avLst/>
@@ -1242,7 +1292,7 @@
       </p:grpSpPr>
       <p:sp>
         <p:nvSpPr>
-          <p:cNvPr id="65" name="PlaceHolder 1"/>
+          <p:cNvPr id="67" name="PlaceHolder 1"/>
           <p:cNvSpPr>
             <a:spLocks noGrp="1"/>
           </p:cNvSpPr>
@@ -1269,7 +1319,7 @@
       </p:sp>
       <p:sp>
         <p:nvSpPr>
-          <p:cNvPr id="66" name="PlaceHolder 2"/>
+          <p:cNvPr id="68" name="PlaceHolder 2"/>
           <p:cNvSpPr>
             <a:spLocks noGrp="1"/>
           </p:cNvSpPr>
@@ -1280,7 +1330,7 @@
         <p:spPr>
           <a:xfrm>
             <a:off x="457200" y="1604520"/>
-            <a:ext cx="8046360" cy="1896840"/>
+            <a:ext cx="8229240" cy="1896840"/>
           </a:xfrm>
           <a:prstGeom prst="rect">
             <a:avLst/>
@@ -1295,7 +1345,7 @@
       </p:sp>
       <p:sp>
         <p:nvSpPr>
-          <p:cNvPr id="67" name="PlaceHolder 3"/>
+          <p:cNvPr id="69" name="PlaceHolder 3"/>
           <p:cNvSpPr>
             <a:spLocks noGrp="1"/>
           </p:cNvSpPr>
@@ -1306,7 +1356,7 @@
         <p:spPr>
           <a:xfrm>
             <a:off x="457200" y="3681720"/>
-            <a:ext cx="8046360" cy="1896840"/>
+            <a:ext cx="8229240" cy="1896840"/>
           </a:xfrm>
           <a:prstGeom prst="rect">
             <a:avLst/>
@@ -1343,7 +1393,7 @@
       </p:grpSpPr>
       <p:sp>
         <p:nvSpPr>
-          <p:cNvPr id="68" name="PlaceHolder 1"/>
+          <p:cNvPr id="70" name="PlaceHolder 1"/>
           <p:cNvSpPr>
             <a:spLocks noGrp="1"/>
           </p:cNvSpPr>
@@ -1370,7 +1420,7 @@
       </p:sp>
       <p:sp>
         <p:nvSpPr>
-          <p:cNvPr id="69" name="PlaceHolder 2"/>
+          <p:cNvPr id="71" name="PlaceHolder 2"/>
           <p:cNvSpPr>
             <a:spLocks noGrp="1"/>
           </p:cNvSpPr>
@@ -1381,7 +1431,7 @@
         <p:spPr>
           <a:xfrm>
             <a:off x="457200" y="1604520"/>
-            <a:ext cx="3926160" cy="1896840"/>
+            <a:ext cx="4015440" cy="1896840"/>
           </a:xfrm>
           <a:prstGeom prst="rect">
             <a:avLst/>
@@ -1396,7 +1446,7 @@
       </p:sp>
       <p:sp>
         <p:nvSpPr>
-          <p:cNvPr id="70" name="PlaceHolder 3"/>
+          <p:cNvPr id="72" name="PlaceHolder 3"/>
           <p:cNvSpPr>
             <a:spLocks noGrp="1"/>
           </p:cNvSpPr>
@@ -1406,8 +1456,8 @@
         </p:nvSpPr>
         <p:spPr>
           <a:xfrm>
-            <a:off x="4579920" y="1604520"/>
-            <a:ext cx="3926160" cy="1896840"/>
+            <a:off x="4673520" y="1604520"/>
+            <a:ext cx="4015440" cy="1896840"/>
           </a:xfrm>
           <a:prstGeom prst="rect">
             <a:avLst/>
@@ -1422,7 +1472,7 @@
       </p:sp>
       <p:sp>
         <p:nvSpPr>
-          <p:cNvPr id="71" name="PlaceHolder 4"/>
+          <p:cNvPr id="73" name="PlaceHolder 4"/>
           <p:cNvSpPr>
             <a:spLocks noGrp="1"/>
           </p:cNvSpPr>
@@ -1432,8 +1482,8 @@
         </p:nvSpPr>
         <p:spPr>
           <a:xfrm>
-            <a:off x="4579920" y="3681720"/>
-            <a:ext cx="3926160" cy="1896840"/>
+            <a:off x="4673520" y="3681720"/>
+            <a:ext cx="4015440" cy="1896840"/>
           </a:xfrm>
           <a:prstGeom prst="rect">
             <a:avLst/>
@@ -1448,7 +1498,7 @@
       </p:sp>
       <p:sp>
         <p:nvSpPr>
-          <p:cNvPr id="72" name="PlaceHolder 5"/>
+          <p:cNvPr id="74" name="PlaceHolder 5"/>
           <p:cNvSpPr>
             <a:spLocks noGrp="1"/>
           </p:cNvSpPr>
@@ -1459,7 +1509,7 @@
         <p:spPr>
           <a:xfrm>
             <a:off x="457200" y="3681720"/>
-            <a:ext cx="3926160" cy="1896840"/>
+            <a:ext cx="4015440" cy="1896840"/>
           </a:xfrm>
           <a:prstGeom prst="rect">
             <a:avLst/>
@@ -1496,7 +1546,7 @@
       </p:grpSpPr>
       <p:sp>
         <p:nvSpPr>
-          <p:cNvPr id="73" name="PlaceHolder 1"/>
+          <p:cNvPr id="75" name="PlaceHolder 1"/>
           <p:cNvSpPr>
             <a:spLocks noGrp="1"/>
           </p:cNvSpPr>
@@ -1523,7 +1573,7 @@
       </p:sp>
       <p:sp>
         <p:nvSpPr>
-          <p:cNvPr id="74" name="PlaceHolder 2"/>
+          <p:cNvPr id="76" name="PlaceHolder 2"/>
           <p:cNvSpPr>
             <a:spLocks noGrp="1"/>
           </p:cNvSpPr>
@@ -1534,7 +1584,7 @@
         <p:spPr>
           <a:xfrm>
             <a:off x="457200" y="1604520"/>
-            <a:ext cx="3926160" cy="1896840"/>
+            <a:ext cx="4015440" cy="1896840"/>
           </a:xfrm>
           <a:prstGeom prst="rect">
             <a:avLst/>
@@ -1549,7 +1599,7 @@
       </p:sp>
       <p:sp>
         <p:nvSpPr>
-          <p:cNvPr id="75" name="PlaceHolder 3"/>
+          <p:cNvPr id="77" name="PlaceHolder 3"/>
           <p:cNvSpPr>
             <a:spLocks noGrp="1"/>
           </p:cNvSpPr>
@@ -1559,8 +1609,8 @@
         </p:nvSpPr>
         <p:spPr>
           <a:xfrm>
-            <a:off x="4579920" y="1604520"/>
-            <a:ext cx="3926160" cy="1896840"/>
+            <a:off x="4673520" y="1604520"/>
+            <a:ext cx="4015440" cy="1896840"/>
           </a:xfrm>
           <a:prstGeom prst="rect">
             <a:avLst/>
@@ -1573,6 +1623,56 @@
           </a:p>
         </p:txBody>
       </p:sp>
+      <p:pic>
+        <p:nvPicPr>
+          <p:cNvPr descr="" id="78" name=""/>
+          <p:cNvPicPr/>
+          <p:nvPr/>
+        </p:nvPicPr>
+        <p:blipFill>
+          <a:blip r:embed="rId2"/>
+          <a:stretch>
+            <a:fillRect/>
+          </a:stretch>
+        </p:blipFill>
+        <p:spPr>
+          <a:xfrm>
+            <a:off x="5492520" y="3681360"/>
+            <a:ext cx="2377440" cy="1896840"/>
+          </a:xfrm>
+          <a:prstGeom prst="rect">
+            <a:avLst/>
+          </a:prstGeom>
+          <a:ln>
+            <a:noFill/>
+          </a:ln>
+        </p:spPr>
+      </p:pic>
+      <p:pic>
+        <p:nvPicPr>
+          <p:cNvPr descr="" id="79" name=""/>
+          <p:cNvPicPr/>
+          <p:nvPr/>
+        </p:nvPicPr>
+        <p:blipFill>
+          <a:blip r:embed="rId3"/>
+          <a:stretch>
+            <a:fillRect/>
+          </a:stretch>
+        </p:blipFill>
+        <p:spPr>
+          <a:xfrm>
+            <a:off x="1276200" y="3681360"/>
+            <a:ext cx="2377440" cy="1896840"/>
+          </a:xfrm>
+          <a:prstGeom prst="rect">
+            <a:avLst/>
+          </a:prstGeom>
+          <a:ln>
+            <a:noFill/>
+          </a:ln>
+        </p:spPr>
+      </p:pic>
     </p:spTree>
   </p:cSld>
 </p:sldLayout>
@@ -1635,7 +1735,7 @@
         <p:spPr>
           <a:xfrm>
             <a:off x="457200" y="1604520"/>
-            <a:ext cx="8046360" cy="3977280"/>
+            <a:ext cx="8229240" cy="3977280"/>
           </a:xfrm>
           <a:prstGeom prst="rect">
             <a:avLst/>
@@ -1710,7 +1810,7 @@
         <p:spPr>
           <a:xfrm>
             <a:off x="457200" y="1604520"/>
-            <a:ext cx="3926160" cy="3977280"/>
+            <a:ext cx="4015440" cy="3977280"/>
           </a:xfrm>
           <a:prstGeom prst="rect">
             <a:avLst/>
@@ -1735,8 +1835,8 @@
         </p:nvSpPr>
         <p:spPr>
           <a:xfrm>
-            <a:off x="4579920" y="1604520"/>
-            <a:ext cx="3926160" cy="3977280"/>
+            <a:off x="4673520" y="1604520"/>
+            <a:ext cx="4015440" cy="3977280"/>
           </a:xfrm>
           <a:prstGeom prst="rect">
             <a:avLst/>
@@ -1909,7 +2009,7 @@
         <p:spPr>
           <a:xfrm>
             <a:off x="457200" y="1604520"/>
-            <a:ext cx="3926160" cy="1896840"/>
+            <a:ext cx="4015440" cy="1896840"/>
           </a:xfrm>
           <a:prstGeom prst="rect">
             <a:avLst/>
@@ -1935,7 +2035,7 @@
         <p:spPr>
           <a:xfrm>
             <a:off x="457200" y="3681720"/>
-            <a:ext cx="3926160" cy="1896840"/>
+            <a:ext cx="4015440" cy="1896840"/>
           </a:xfrm>
           <a:prstGeom prst="rect">
             <a:avLst/>
@@ -1960,8 +2060,8 @@
         </p:nvSpPr>
         <p:spPr>
           <a:xfrm>
-            <a:off x="4579920" y="1604520"/>
-            <a:ext cx="3926160" cy="3977280"/>
+            <a:off x="4673520" y="1604520"/>
+            <a:ext cx="4015440" cy="3977280"/>
           </a:xfrm>
           <a:prstGeom prst="rect">
             <a:avLst/>
@@ -2036,7 +2136,7 @@
         <p:spPr>
           <a:xfrm>
             <a:off x="457200" y="1604520"/>
-            <a:ext cx="3926160" cy="3977280"/>
+            <a:ext cx="4015440" cy="3977280"/>
           </a:xfrm>
           <a:prstGeom prst="rect">
             <a:avLst/>
@@ -2061,8 +2161,8 @@
         </p:nvSpPr>
         <p:spPr>
           <a:xfrm>
-            <a:off x="4579920" y="1604520"/>
-            <a:ext cx="3926160" cy="1896840"/>
+            <a:off x="4673520" y="1604520"/>
+            <a:ext cx="4015440" cy="1896840"/>
           </a:xfrm>
           <a:prstGeom prst="rect">
             <a:avLst/>
@@ -2087,8 +2187,8 @@
         </p:nvSpPr>
         <p:spPr>
           <a:xfrm>
-            <a:off x="4579920" y="3681720"/>
-            <a:ext cx="3926160" cy="1896840"/>
+            <a:off x="4673520" y="3681720"/>
+            <a:ext cx="4015440" cy="1896840"/>
           </a:xfrm>
           <a:prstGeom prst="rect">
             <a:avLst/>
@@ -2163,7 +2263,7 @@
         <p:spPr>
           <a:xfrm>
             <a:off x="457200" y="1604520"/>
-            <a:ext cx="3926160" cy="1896840"/>
+            <a:ext cx="4015440" cy="1896840"/>
           </a:xfrm>
           <a:prstGeom prst="rect">
             <a:avLst/>
@@ -2188,8 +2288,8 @@
         </p:nvSpPr>
         <p:spPr>
           <a:xfrm>
-            <a:off x="4579920" y="1604520"/>
-            <a:ext cx="3926160" cy="1896840"/>
+            <a:off x="4673520" y="1604520"/>
+            <a:ext cx="4015440" cy="1896840"/>
           </a:xfrm>
           <a:prstGeom prst="rect">
             <a:avLst/>
@@ -2215,7 +2315,7 @@
         <p:spPr>
           <a:xfrm>
             <a:off x="457200" y="3681720"/>
-            <a:ext cx="8045640" cy="1896840"/>
+            <a:ext cx="8228520" cy="1896840"/>
           </a:xfrm>
           <a:prstGeom prst="rect">
             <a:avLst/>
@@ -2272,11 +2372,14 @@
         <p:spPr>
           <a:xfrm>
             <a:off x="9720" y="5356440"/>
-            <a:ext cx="9142920" cy="1459080"/>
-          </a:xfrm>
-          <a:prstGeom prst="rect">
-            <a:avLst/>
-          </a:prstGeom>
+            <a:ext cx="9142560" cy="1458720"/>
+          </a:xfrm>
+          <a:prstGeom prst="rect">
+            <a:avLst/>
+          </a:prstGeom>
+          <a:ln>
+            <a:noFill/>
+          </a:ln>
         </p:spPr>
       </p:pic>
       <p:pic>
@@ -2294,11 +2397,14 @@
         <p:spPr>
           <a:xfrm>
             <a:off x="7742160" y="6368760"/>
-            <a:ext cx="1177200" cy="254160"/>
-          </a:xfrm>
-          <a:prstGeom prst="rect">
-            <a:avLst/>
-          </a:prstGeom>
+            <a:ext cx="1176840" cy="253800"/>
+          </a:xfrm>
+          <a:prstGeom prst="rect">
+            <a:avLst/>
+          </a:prstGeom>
+          <a:ln>
+            <a:noFill/>
+          </a:ln>
         </p:spPr>
       </p:pic>
       <p:pic>
@@ -2316,11 +2422,14 @@
         <p:spPr>
           <a:xfrm>
             <a:off x="1153440" y="2393640"/>
-            <a:ext cx="2003760" cy="1992240"/>
-          </a:xfrm>
-          <a:prstGeom prst="rect">
-            <a:avLst/>
-          </a:prstGeom>
+            <a:ext cx="2003400" cy="1991880"/>
+          </a:xfrm>
+          <a:prstGeom prst="rect">
+            <a:avLst/>
+          </a:prstGeom>
+          <a:ln>
+            <a:noFill/>
+          </a:ln>
         </p:spPr>
       </p:pic>
       <p:sp>
@@ -2433,7 +2542,7 @@
         <p:spPr>
           <a:xfrm>
             <a:off x="457200" y="1604520"/>
-            <a:ext cx="8046360" cy="3977280"/>
+            <a:ext cx="8229240" cy="3977280"/>
           </a:xfrm>
           <a:prstGeom prst="rect">
             <a:avLst/>
@@ -2443,7 +2552,7 @@
           <a:bodyPr bIns="0" lIns="0" rIns="0" tIns="0" wrap="none"/>
           <a:p>
             <a:pPr>
-              <a:buSzPct val="45000"/>
+              <a:buSzPct val="25000"/>
               <a:buFont typeface="StarSymbol"/>
               <a:buChar char=""/>
             </a:pPr>
@@ -2455,7 +2564,7 @@
           </a:p>
           <a:p>
             <a:pPr lvl="1">
-              <a:buSzPct val="75000"/>
+              <a:buSzPct val="25000"/>
               <a:buFont typeface="StarSymbol"/>
               <a:buChar char=""/>
             </a:pPr>
@@ -2467,7 +2576,7 @@
           </a:p>
           <a:p>
             <a:pPr lvl="2">
-              <a:buSzPct val="45000"/>
+              <a:buSzPct val="25000"/>
               <a:buFont typeface="StarSymbol"/>
               <a:buChar char=""/>
             </a:pPr>
@@ -2479,7 +2588,7 @@
           </a:p>
           <a:p>
             <a:pPr lvl="3">
-              <a:buSzPct val="75000"/>
+              <a:buSzPct val="25000"/>
               <a:buFont typeface="StarSymbol"/>
               <a:buChar char=""/>
             </a:pPr>
@@ -2491,7 +2600,7 @@
           </a:p>
           <a:p>
             <a:pPr lvl="4">
-              <a:buSzPct val="45000"/>
+              <a:buSzPct val="25000"/>
               <a:buFont typeface="StarSymbol"/>
               <a:buChar char=""/>
             </a:pPr>
@@ -2503,7 +2612,7 @@
           </a:p>
           <a:p>
             <a:pPr lvl="5">
-              <a:buSzPct val="45000"/>
+              <a:buSzPct val="25000"/>
               <a:buFont typeface="StarSymbol"/>
               <a:buChar char=""/>
             </a:pPr>
@@ -2515,7 +2624,7 @@
           </a:p>
           <a:p>
             <a:pPr lvl="6">
-              <a:buSzPct val="45000"/>
+              <a:buSzPct val="25000"/>
               <a:buFont typeface="StarSymbol"/>
               <a:buChar char=""/>
             </a:pPr>
@@ -2573,7 +2682,7 @@
       </p:grpSpPr>
       <p:pic>
         <p:nvPicPr>
-          <p:cNvPr descr="" id="40" name="Image 6"/>
+          <p:cNvPr descr="" id="42" name="Image 6"/>
           <p:cNvPicPr/>
           <p:nvPr/>
         </p:nvPicPr>
@@ -2586,16 +2695,19 @@
         <p:spPr>
           <a:xfrm>
             <a:off x="9720" y="5356440"/>
-            <a:ext cx="9142920" cy="1459080"/>
-          </a:xfrm>
-          <a:prstGeom prst="rect">
-            <a:avLst/>
-          </a:prstGeom>
+            <a:ext cx="9142560" cy="1458720"/>
+          </a:xfrm>
+          <a:prstGeom prst="rect">
+            <a:avLst/>
+          </a:prstGeom>
+          <a:ln>
+            <a:noFill/>
+          </a:ln>
         </p:spPr>
       </p:pic>
       <p:pic>
         <p:nvPicPr>
-          <p:cNvPr descr="" id="41" name="Image 7"/>
+          <p:cNvPr descr="" id="43" name="Image 7"/>
           <p:cNvPicPr/>
           <p:nvPr/>
         </p:nvPicPr>
@@ -2608,16 +2720,19 @@
         <p:spPr>
           <a:xfrm>
             <a:off x="7742160" y="6368760"/>
-            <a:ext cx="1177200" cy="254160"/>
-          </a:xfrm>
-          <a:prstGeom prst="rect">
-            <a:avLst/>
-          </a:prstGeom>
+            <a:ext cx="1176840" cy="253800"/>
+          </a:xfrm>
+          <a:prstGeom prst="rect">
+            <a:avLst/>
+          </a:prstGeom>
+          <a:ln>
+            <a:noFill/>
+          </a:ln>
         </p:spPr>
       </p:pic>
       <p:sp>
         <p:nvSpPr>
-          <p:cNvPr id="42" name="PlaceHolder 1"/>
+          <p:cNvPr id="44" name="PlaceHolder 1"/>
           <p:cNvSpPr>
             <a:spLocks noGrp="1"/>
           </p:cNvSpPr>
@@ -2648,7 +2763,7 @@
       </p:sp>
       <p:sp>
         <p:nvSpPr>
-          <p:cNvPr id="43" name="PlaceHolder 2"/>
+          <p:cNvPr id="45" name="PlaceHolder 2"/>
           <p:cNvSpPr>
             <a:spLocks noGrp="1"/>
           </p:cNvSpPr>
@@ -2659,7 +2774,7 @@
         <p:spPr>
           <a:xfrm>
             <a:off x="457200" y="1604520"/>
-            <a:ext cx="8046360" cy="3977280"/>
+            <a:ext cx="8229240" cy="3977280"/>
           </a:xfrm>
           <a:prstGeom prst="rect">
             <a:avLst/>
@@ -2669,7 +2784,7 @@
           <a:bodyPr bIns="0" lIns="0" rIns="0" tIns="0" wrap="none"/>
           <a:p>
             <a:pPr>
-              <a:buSzPct val="45000"/>
+              <a:buSzPct val="25000"/>
               <a:buFont typeface="StarSymbol"/>
               <a:buChar char=""/>
             </a:pPr>
@@ -2681,7 +2796,7 @@
           </a:p>
           <a:p>
             <a:pPr lvl="1">
-              <a:buSzPct val="75000"/>
+              <a:buSzPct val="25000"/>
               <a:buFont typeface="StarSymbol"/>
               <a:buChar char=""/>
             </a:pPr>
@@ -2693,7 +2808,7 @@
           </a:p>
           <a:p>
             <a:pPr lvl="2">
-              <a:buSzPct val="45000"/>
+              <a:buSzPct val="25000"/>
               <a:buFont typeface="StarSymbol"/>
               <a:buChar char=""/>
             </a:pPr>
@@ -2705,7 +2820,7 @@
           </a:p>
           <a:p>
             <a:pPr lvl="3">
-              <a:buSzPct val="75000"/>
+              <a:buSzPct val="25000"/>
               <a:buFont typeface="StarSymbol"/>
               <a:buChar char=""/>
             </a:pPr>
@@ -2717,7 +2832,7 @@
           </a:p>
           <a:p>
             <a:pPr lvl="4">
-              <a:buSzPct val="45000"/>
+              <a:buSzPct val="25000"/>
               <a:buFont typeface="StarSymbol"/>
               <a:buChar char=""/>
             </a:pPr>
@@ -2729,7 +2844,7 @@
           </a:p>
           <a:p>
             <a:pPr lvl="5">
-              <a:buSzPct val="45000"/>
+              <a:buSzPct val="25000"/>
               <a:buFont typeface="StarSymbol"/>
               <a:buChar char=""/>
             </a:pPr>
@@ -2741,7 +2856,7 @@
           </a:p>
           <a:p>
             <a:pPr lvl="6">
-              <a:buSzPct val="45000"/>
+              <a:buSzPct val="25000"/>
               <a:buFont typeface="StarSymbol"/>
               <a:buChar char=""/>
             </a:pPr>
@@ -2792,18 +2907,22 @@
       </p:grpSpPr>
       <p:sp>
         <p:nvSpPr>
-          <p:cNvPr id="76" name="CustomShape 1"/>
+          <p:cNvPr id="80" name="CustomShape 1"/>
           <p:cNvSpPr/>
           <p:nvPr/>
         </p:nvSpPr>
         <p:spPr>
           <a:xfrm>
             <a:off x="2517120" y="1213920"/>
-            <a:ext cx="6270480" cy="732960"/>
-          </a:xfrm>
-          <a:prstGeom prst="rect">
-            <a:avLst/>
-          </a:prstGeom>
+            <a:ext cx="6270120" cy="732600"/>
+          </a:xfrm>
+          <a:prstGeom prst="rect">
+            <a:avLst/>
+          </a:prstGeom>
+          <a:noFill/>
+          <a:ln>
+            <a:noFill/>
+          </a:ln>
         </p:spPr>
         <p:txBody>
           <a:bodyPr bIns="45000" lIns="90000" rIns="90000" tIns="45000"/>
@@ -2828,18 +2947,22 @@
       </p:sp>
       <p:sp>
         <p:nvSpPr>
-          <p:cNvPr id="77" name="CustomShape 2"/>
+          <p:cNvPr id="81" name="CustomShape 2"/>
           <p:cNvSpPr/>
           <p:nvPr/>
         </p:nvSpPr>
         <p:spPr>
           <a:xfrm>
             <a:off x="0" y="1803240"/>
-            <a:ext cx="1364400" cy="220680"/>
-          </a:xfrm>
-          <a:prstGeom prst="rect">
-            <a:avLst/>
-          </a:prstGeom>
+            <a:ext cx="1364040" cy="220320"/>
+          </a:xfrm>
+          <a:prstGeom prst="rect">
+            <a:avLst/>
+          </a:prstGeom>
+          <a:noFill/>
+          <a:ln>
+            <a:noFill/>
+          </a:ln>
         </p:spPr>
         <p:txBody>
           <a:bodyPr bIns="49680" lIns="99720" rIns="99720" tIns="49680"/>
@@ -2864,18 +2987,22 @@
       </p:sp>
       <p:sp>
         <p:nvSpPr>
-          <p:cNvPr id="78" name="CustomShape 3"/>
+          <p:cNvPr id="82" name="CustomShape 3"/>
           <p:cNvSpPr/>
           <p:nvPr/>
         </p:nvSpPr>
         <p:spPr>
           <a:xfrm>
             <a:off x="1110600" y="5019120"/>
-            <a:ext cx="932400" cy="256320"/>
-          </a:xfrm>
-          <a:prstGeom prst="rect">
-            <a:avLst/>
-          </a:prstGeom>
+            <a:ext cx="932040" cy="255960"/>
+          </a:xfrm>
+          <a:prstGeom prst="rect">
+            <a:avLst/>
+          </a:prstGeom>
+          <a:noFill/>
+          <a:ln>
+            <a:noFill/>
+          </a:ln>
         </p:spPr>
         <p:txBody>
           <a:bodyPr bIns="49680" lIns="99720" rIns="99720" tIns="49680"/>
@@ -2900,18 +3027,22 @@
       </p:sp>
       <p:sp>
         <p:nvSpPr>
-          <p:cNvPr id="79" name="CustomShape 4"/>
+          <p:cNvPr id="83" name="CustomShape 4"/>
           <p:cNvSpPr/>
           <p:nvPr/>
         </p:nvSpPr>
         <p:spPr>
           <a:xfrm>
             <a:off x="3255840" y="4416480"/>
-            <a:ext cx="1223640" cy="256320"/>
-          </a:xfrm>
-          <a:prstGeom prst="rect">
-            <a:avLst/>
-          </a:prstGeom>
+            <a:ext cx="1223280" cy="255960"/>
+          </a:xfrm>
+          <a:prstGeom prst="rect">
+            <a:avLst/>
+          </a:prstGeom>
+          <a:noFill/>
+          <a:ln>
+            <a:noFill/>
+          </a:ln>
         </p:spPr>
         <p:txBody>
           <a:bodyPr bIns="49680" lIns="99720" rIns="99720" tIns="49680"/>
@@ -2936,18 +3067,22 @@
       </p:sp>
       <p:sp>
         <p:nvSpPr>
-          <p:cNvPr id="80" name="CustomShape 5"/>
+          <p:cNvPr id="84" name="CustomShape 5"/>
           <p:cNvSpPr/>
           <p:nvPr/>
         </p:nvSpPr>
         <p:spPr>
           <a:xfrm>
             <a:off x="3695760" y="1931760"/>
-            <a:ext cx="5092200" cy="842400"/>
-          </a:xfrm>
-          <a:prstGeom prst="rect">
-            <a:avLst/>
-          </a:prstGeom>
+            <a:ext cx="5091840" cy="842040"/>
+          </a:xfrm>
+          <a:prstGeom prst="rect">
+            <a:avLst/>
+          </a:prstGeom>
+          <a:noFill/>
+          <a:ln>
+            <a:noFill/>
+          </a:ln>
         </p:spPr>
         <p:txBody>
           <a:bodyPr bIns="45000" lIns="90000" rIns="90000" tIns="45000"/>
@@ -2964,7 +3099,7 @@
                 </a:solidFill>
                 <a:latin typeface="Lucida Sans Unicode"/>
               </a:rPr>
-              <a:t>- Lambdauttryck I Java 8</a:t>
+              <a:t>- Lambdas in Java 8</a:t>
             </a:r>
             <a:endParaRPr/>
           </a:p>
@@ -2981,7 +3116,7 @@
                 </a:solidFill>
                 <a:latin typeface="Lucida Sans Unicode"/>
               </a:rPr>
-              <a:t>2012-11-04</a:t>
+              <a:t>2013-12-16</a:t>
             </a:r>
             <a:endParaRPr/>
           </a:p>
@@ -2995,9 +3130,7 @@
         <p:cTn dur="indefinite" id="1" nodeType="tmRoot" restart="never">
           <p:childTnLst>
             <p:seq>
-              <p:cTn id="2" nodeType="mainSeq">
-                <p:childTnLst/>
-              </p:cTn>
+              <p:cTn id="2" nodeType="mainSeq"/>
               <p:prevCondLst>
                 <p:cond delay="0" evt="onPrev">
                   <p:tgtEl>
@@ -3040,18 +3173,22 @@
       </p:grpSpPr>
       <p:sp>
         <p:nvSpPr>
-          <p:cNvPr id="81" name="CustomShape 1"/>
+          <p:cNvPr id="85" name="CustomShape 1"/>
           <p:cNvSpPr/>
           <p:nvPr/>
         </p:nvSpPr>
         <p:spPr>
           <a:xfrm>
             <a:off x="497160" y="57960"/>
-            <a:ext cx="7821000" cy="1161360"/>
-          </a:xfrm>
-          <a:prstGeom prst="rect">
-            <a:avLst/>
-          </a:prstGeom>
+            <a:ext cx="7820640" cy="1161000"/>
+          </a:xfrm>
+          <a:prstGeom prst="rect">
+            <a:avLst/>
+          </a:prstGeom>
+          <a:noFill/>
+          <a:ln>
+            <a:noFill/>
+          </a:ln>
         </p:spPr>
         <p:txBody>
           <a:bodyPr anchor="b" bIns="45000" lIns="90000" rIns="90000" tIns="45000"/>
@@ -3076,18 +3213,22 @@
       </p:sp>
       <p:sp>
         <p:nvSpPr>
-          <p:cNvPr id="82" name="CustomShape 2"/>
+          <p:cNvPr id="86" name="CustomShape 2"/>
           <p:cNvSpPr/>
           <p:nvPr/>
         </p:nvSpPr>
         <p:spPr>
           <a:xfrm>
             <a:off x="871200" y="1626840"/>
-            <a:ext cx="7809120" cy="3665160"/>
-          </a:xfrm>
-          <a:prstGeom prst="rect">
-            <a:avLst/>
-          </a:prstGeom>
+            <a:ext cx="7808760" cy="3664800"/>
+          </a:xfrm>
+          <a:prstGeom prst="rect">
+            <a:avLst/>
+          </a:prstGeom>
+          <a:noFill/>
+          <a:ln>
+            <a:noFill/>
+          </a:ln>
         </p:spPr>
         <p:txBody>
           <a:bodyPr bIns="45000" lIns="90000" rIns="90000" tIns="45000"/>
@@ -3279,9 +3420,7 @@
         <p:cTn dur="indefinite" id="3" nodeType="tmRoot" restart="never">
           <p:childTnLst>
             <p:seq>
-              <p:cTn id="4" nodeType="mainSeq">
-                <p:childTnLst/>
-              </p:cTn>
+              <p:cTn id="4" nodeType="mainSeq"/>
               <p:prevCondLst>
                 <p:cond delay="0" evt="onPrev">
                   <p:tgtEl>
@@ -3324,18 +3463,22 @@
       </p:grpSpPr>
       <p:sp>
         <p:nvSpPr>
-          <p:cNvPr id="83" name="CustomShape 1"/>
+          <p:cNvPr id="87" name="CustomShape 1"/>
           <p:cNvSpPr/>
           <p:nvPr/>
         </p:nvSpPr>
         <p:spPr>
           <a:xfrm>
             <a:off x="497160" y="57960"/>
-            <a:ext cx="7821000" cy="1161360"/>
-          </a:xfrm>
-          <a:prstGeom prst="rect">
-            <a:avLst/>
-          </a:prstGeom>
+            <a:ext cx="7820640" cy="1161000"/>
+          </a:xfrm>
+          <a:prstGeom prst="rect">
+            <a:avLst/>
+          </a:prstGeom>
+          <a:noFill/>
+          <a:ln>
+            <a:noFill/>
+          </a:ln>
         </p:spPr>
         <p:txBody>
           <a:bodyPr anchor="b" bIns="45000" lIns="90000" rIns="90000" tIns="45000"/>
@@ -3360,18 +3503,22 @@
       </p:sp>
       <p:sp>
         <p:nvSpPr>
-          <p:cNvPr id="84" name="CustomShape 2"/>
+          <p:cNvPr id="88" name="CustomShape 2"/>
           <p:cNvSpPr/>
           <p:nvPr/>
         </p:nvSpPr>
         <p:spPr>
           <a:xfrm>
             <a:off x="871200" y="1626840"/>
-            <a:ext cx="7809120" cy="3665160"/>
-          </a:xfrm>
-          <a:prstGeom prst="rect">
-            <a:avLst/>
-          </a:prstGeom>
+            <a:ext cx="7808760" cy="3664800"/>
+          </a:xfrm>
+          <a:prstGeom prst="rect">
+            <a:avLst/>
+          </a:prstGeom>
+          <a:noFill/>
+          <a:ln>
+            <a:noFill/>
+          </a:ln>
         </p:spPr>
         <p:txBody>
           <a:bodyPr bIns="45000" lIns="90000" rIns="90000" tIns="45000"/>
@@ -3550,8 +3697,6 @@
               <a:lnSpc>
                 <a:spcPct val="100000"/>
               </a:lnSpc>
-              <a:buFont typeface="Arial"/>
-              <a:buChar char="•"/>
             </a:pPr>
             <a:endParaRPr/>
           </a:p>
@@ -3591,9 +3736,7 @@
         <p:cTn dur="indefinite" id="5" nodeType="tmRoot" restart="never">
           <p:childTnLst>
             <p:seq>
-              <p:cTn id="6" nodeType="mainSeq">
-                <p:childTnLst/>
-              </p:cTn>
+              <p:cTn id="6" nodeType="mainSeq"/>
               <p:prevCondLst>
                 <p:cond delay="0" evt="onPrev">
                   <p:tgtEl>
@@ -3636,18 +3779,22 @@
       </p:grpSpPr>
       <p:sp>
         <p:nvSpPr>
-          <p:cNvPr id="85" name="CustomShape 1"/>
+          <p:cNvPr id="89" name="CustomShape 1"/>
           <p:cNvSpPr/>
           <p:nvPr/>
         </p:nvSpPr>
         <p:spPr>
           <a:xfrm>
             <a:off x="497160" y="57960"/>
-            <a:ext cx="7821000" cy="1161360"/>
-          </a:xfrm>
-          <a:prstGeom prst="rect">
-            <a:avLst/>
-          </a:prstGeom>
+            <a:ext cx="7820640" cy="1161000"/>
+          </a:xfrm>
+          <a:prstGeom prst="rect">
+            <a:avLst/>
+          </a:prstGeom>
+          <a:noFill/>
+          <a:ln>
+            <a:noFill/>
+          </a:ln>
         </p:spPr>
         <p:txBody>
           <a:bodyPr anchor="b" bIns="45000" lIns="90000" rIns="90000" tIns="45000"/>
@@ -3659,26 +3806,30 @@
                 </a:solidFill>
                 <a:latin typeface="Lucida Bright"/>
               </a:rPr>
-              <a:t>Varför Lambdas?</a:t>
-            </a:r>
-            <a:endParaRPr/>
-          </a:p>
-        </p:txBody>
-      </p:sp>
-      <p:sp>
-        <p:nvSpPr>
-          <p:cNvPr id="86" name="CustomShape 2"/>
+              <a:t>Why Lambdas?</a:t>
+            </a:r>
+            <a:endParaRPr/>
+          </a:p>
+        </p:txBody>
+      </p:sp>
+      <p:sp>
+        <p:nvSpPr>
+          <p:cNvPr id="90" name="CustomShape 2"/>
           <p:cNvSpPr/>
           <p:nvPr/>
         </p:nvSpPr>
         <p:spPr>
           <a:xfrm>
             <a:off x="871200" y="1626840"/>
-            <a:ext cx="7809120" cy="3665160"/>
-          </a:xfrm>
-          <a:prstGeom prst="rect">
-            <a:avLst/>
-          </a:prstGeom>
+            <a:ext cx="7808760" cy="3664800"/>
+          </a:xfrm>
+          <a:prstGeom prst="rect">
+            <a:avLst/>
+          </a:prstGeom>
+          <a:noFill/>
+          <a:ln>
+            <a:noFill/>
+          </a:ln>
         </p:spPr>
         <p:txBody>
           <a:bodyPr bIns="45000" lIns="90000" rIns="90000" tIns="45000"/>
@@ -3695,9 +3846,9 @@
               <a:lnSpc>
                 <a:spcPct val="100000"/>
               </a:lnSpc>
-              <a:buSzPct val="45000"/>
+              <a:buSzPct val="25000"/>
               <a:buFont typeface="StarSymbol"/>
-              <a:buChar char=""/>
+              <a:buChar char="l"/>
             </a:pPr>
             <a:r>
               <a:rPr lang="en-US" sz="2000">
@@ -3705,7 +3856,7 @@
                   <a:srgbClr val="3095b4"/>
                 </a:solidFill>
               </a:rPr>
-              <a:t>En stor anledning är sådan här kod:</a:t>
+              <a:t>People are tired of writing code like this:</a:t>
             </a:r>
             <a:endParaRPr/>
           </a:p>
@@ -3835,7 +3986,7 @@
                   <a:srgbClr val="3095b4"/>
                 </a:solidFill>
               </a:rPr>
-              <a:t>Interna klassladdningsbekymmer</a:t>
+              <a:t>Easier parallelization</a:t>
             </a:r>
             <a:endParaRPr/>
           </a:p>
@@ -3863,17 +4014,15 @@
                   <a:srgbClr val="3095b4"/>
                 </a:solidFill>
               </a:rPr>
-              <a:t>Parallellisering</a:t>
-            </a:r>
-            <a:endParaRPr/>
-          </a:p>
-          <a:p>
-            <a:pPr>
-              <a:lnSpc>
-                <a:spcPct val="100000"/>
-              </a:lnSpc>
-              <a:buFont typeface="Arial"/>
-              <a:buChar char="•"/>
+              <a:t>Scope issues in anonymous classes</a:t>
+            </a:r>
+            <a:endParaRPr/>
+          </a:p>
+          <a:p>
+            <a:pPr>
+              <a:lnSpc>
+                <a:spcPct val="100000"/>
+              </a:lnSpc>
             </a:pPr>
             <a:endParaRPr/>
           </a:p>
@@ -3895,9 +4044,7 @@
         <p:cTn dur="indefinite" id="7" nodeType="tmRoot" restart="never">
           <p:childTnLst>
             <p:seq>
-              <p:cTn id="8" nodeType="mainSeq">
-                <p:childTnLst/>
-              </p:cTn>
+              <p:cTn id="8" nodeType="mainSeq"/>
               <p:prevCondLst>
                 <p:cond delay="0" evt="onPrev">
                   <p:tgtEl>
@@ -3940,18 +4087,22 @@
       </p:grpSpPr>
       <p:sp>
         <p:nvSpPr>
-          <p:cNvPr id="87" name="CustomShape 1"/>
+          <p:cNvPr id="91" name="CustomShape 1"/>
           <p:cNvSpPr/>
           <p:nvPr/>
         </p:nvSpPr>
         <p:spPr>
           <a:xfrm>
             <a:off x="497160" y="57960"/>
-            <a:ext cx="7821000" cy="1161360"/>
-          </a:xfrm>
-          <a:prstGeom prst="rect">
-            <a:avLst/>
-          </a:prstGeom>
+            <a:ext cx="7820640" cy="1161000"/>
+          </a:xfrm>
+          <a:prstGeom prst="rect">
+            <a:avLst/>
+          </a:prstGeom>
+          <a:noFill/>
+          <a:ln>
+            <a:noFill/>
+          </a:ln>
         </p:spPr>
         <p:txBody>
           <a:bodyPr anchor="b" bIns="45000" lIns="90000" rIns="90000" tIns="45000"/>
@@ -3968,26 +4119,30 @@
                 </a:solidFill>
                 <a:latin typeface="Lucida Bright"/>
               </a:rPr>
-              <a:t>Funktionella interface</a:t>
-            </a:r>
-            <a:endParaRPr/>
-          </a:p>
-        </p:txBody>
-      </p:sp>
-      <p:sp>
-        <p:nvSpPr>
-          <p:cNvPr id="88" name="CustomShape 2"/>
+              <a:t>Funktional interface</a:t>
+            </a:r>
+            <a:endParaRPr/>
+          </a:p>
+        </p:txBody>
+      </p:sp>
+      <p:sp>
+        <p:nvSpPr>
+          <p:cNvPr id="92" name="CustomShape 2"/>
           <p:cNvSpPr/>
           <p:nvPr/>
         </p:nvSpPr>
         <p:spPr>
           <a:xfrm>
             <a:off x="871200" y="1188720"/>
-            <a:ext cx="7809120" cy="4103280"/>
-          </a:xfrm>
-          <a:prstGeom prst="rect">
-            <a:avLst/>
-          </a:prstGeom>
+            <a:ext cx="7808760" cy="4102920"/>
+          </a:xfrm>
+          <a:prstGeom prst="rect">
+            <a:avLst/>
+          </a:prstGeom>
+          <a:noFill/>
+          <a:ln>
+            <a:noFill/>
+          </a:ln>
         </p:spPr>
         <p:txBody>
           <a:bodyPr bIns="45000" lIns="90000" rIns="90000" tIns="45000"/>
@@ -4012,18 +4167,14 @@
               <a:lnSpc>
                 <a:spcPct val="100000"/>
               </a:lnSpc>
-              <a:buFont typeface="Arial"/>
-              <a:buChar char="•"/>
-            </a:pPr>
-            <a:endParaRPr/>
-          </a:p>
-          <a:p>
-            <a:pPr>
-              <a:lnSpc>
-                <a:spcPct val="100000"/>
-              </a:lnSpc>
-              <a:buFont typeface="Arial"/>
-              <a:buChar char="•"/>
+            </a:pPr>
+            <a:endParaRPr/>
+          </a:p>
+          <a:p>
+            <a:pPr>
+              <a:lnSpc>
+                <a:spcPct val="100000"/>
+              </a:lnSpc>
             </a:pPr>
             <a:endParaRPr/>
           </a:p>
@@ -4041,7 +4192,7 @@
                   <a:srgbClr val="3095b4"/>
                 </a:solidFill>
               </a:rPr>
-              <a:t>Ett interface med </a:t>
+              <a:t>An interface with </a:t>
             </a:r>
             <a:r>
               <a:rPr b="1" lang="en-US" sz="2000">
@@ -4049,7 +4200,7 @@
                   <a:srgbClr val="3095b4"/>
                 </a:solidFill>
               </a:rPr>
-              <a:t>exakt en abstrakt metod</a:t>
+              <a:t>exactly one abstract method</a:t>
             </a:r>
             <a:endParaRPr/>
           </a:p>
@@ -4058,7 +4209,7 @@
               <a:lnSpc>
                 <a:spcPct val="100000"/>
               </a:lnSpc>
-              <a:buSzPct val="45000"/>
+              <a:buSzPct val="25000"/>
               <a:buFont typeface="Ubuntu"/>
               <a:buChar char="―"/>
             </a:pPr>
@@ -4093,7 +4244,7 @@
               <a:lnSpc>
                 <a:spcPct val="100000"/>
               </a:lnSpc>
-              <a:buSzPct val="45000"/>
+              <a:buSzPct val="25000"/>
               <a:buFont typeface="StarSymbol"/>
               <a:buChar char="l"/>
             </a:pPr>
@@ -4112,7 +4263,7 @@
               <a:lnSpc>
                 <a:spcPct val="100000"/>
               </a:lnSpc>
-              <a:buSzPct val="45000"/>
+              <a:buSzPct val="25000"/>
               <a:buFont typeface="StarSymbol"/>
               <a:buChar char="l"/>
             </a:pPr>
@@ -4127,24 +4278,18 @@
             <a:endParaRPr/>
           </a:p>
           <a:p>
-            <a:pPr lvl="3">
-              <a:lnSpc>
-                <a:spcPct val="100000"/>
-              </a:lnSpc>
-              <a:buSzPct val="45000"/>
-              <a:buFont typeface="StarSymbol"/>
-              <a:buChar char="l"/>
-            </a:pPr>
-            <a:endParaRPr/>
-          </a:p>
-          <a:p>
-            <a:pPr lvl="3">
-              <a:lnSpc>
-                <a:spcPct val="100000"/>
-              </a:lnSpc>
-              <a:buSzPct val="45000"/>
-              <a:buFont typeface="StarSymbol"/>
-              <a:buChar char="l"/>
+            <a:pPr>
+              <a:lnSpc>
+                <a:spcPct val="100000"/>
+              </a:lnSpc>
+            </a:pPr>
+            <a:endParaRPr/>
+          </a:p>
+          <a:p>
+            <a:pPr>
+              <a:lnSpc>
+                <a:spcPct val="100000"/>
+              </a:lnSpc>
             </a:pPr>
             <a:endParaRPr/>
           </a:p>
@@ -4162,53 +4307,75 @@
                   <a:srgbClr val="3095b4"/>
                 </a:solidFill>
               </a:rPr>
-              <a:t>Inga speciella nyckelord eller deklarationer</a:t>
-            </a:r>
-            <a:endParaRPr/>
-          </a:p>
-          <a:p>
-            <a:pPr lvl="3">
-              <a:lnSpc>
-                <a:spcPct val="100000"/>
-              </a:lnSpc>
-              <a:buSzPct val="45000"/>
-              <a:buFont typeface="StarSymbol"/>
-              <a:buChar char="l"/>
-            </a:pPr>
-            <a:endParaRPr/>
-          </a:p>
-          <a:p>
-            <a:pPr>
-              <a:lnSpc>
-                <a:spcPct val="100000"/>
-              </a:lnSpc>
-            </a:pPr>
-            <a:endParaRPr/>
-          </a:p>
-          <a:p>
-            <a:pPr>
-              <a:lnSpc>
-                <a:spcPct val="100000"/>
-              </a:lnSpc>
-            </a:pPr>
-            <a:endParaRPr/>
-          </a:p>
-          <a:p>
-            <a:pPr>
-              <a:lnSpc>
-                <a:spcPct val="100000"/>
-              </a:lnSpc>
-            </a:pPr>
-            <a:endParaRPr/>
-          </a:p>
-          <a:p>
-            <a:pPr lvl="1">
-              <a:lnSpc>
-                <a:spcPct val="100000"/>
-              </a:lnSpc>
-              <a:buSzPct val="45000"/>
-              <a:buFont typeface="StarSymbol"/>
-              <a:buChar char="l"/>
+              <a:t>No special declaration is needed</a:t>
+            </a:r>
+            <a:endParaRPr/>
+          </a:p>
+          <a:p>
+            <a:pPr>
+              <a:lnSpc>
+                <a:spcPct val="100000"/>
+              </a:lnSpc>
+              <a:buFont typeface="Arial"/>
+              <a:buChar char="•"/>
+            </a:pPr>
+            <a:endParaRPr/>
+          </a:p>
+          <a:p>
+            <a:pPr>
+              <a:lnSpc>
+                <a:spcPct val="100000"/>
+              </a:lnSpc>
+              <a:buFont typeface="Arial"/>
+              <a:buChar char="•"/>
+            </a:pPr>
+            <a:r>
+              <a:rPr lang="en-US" sz="2000">
+                <a:solidFill>
+                  <a:srgbClr val="3095b4"/>
+                </a:solidFill>
+              </a:rPr>
+              <a:t>@FunctionalInterface (optional)</a:t>
+            </a:r>
+            <a:endParaRPr/>
+          </a:p>
+          <a:p>
+            <a:pPr>
+              <a:lnSpc>
+                <a:spcPct val="100000"/>
+              </a:lnSpc>
+            </a:pPr>
+            <a:endParaRPr/>
+          </a:p>
+          <a:p>
+            <a:pPr>
+              <a:lnSpc>
+                <a:spcPct val="100000"/>
+              </a:lnSpc>
+            </a:pPr>
+            <a:endParaRPr/>
+          </a:p>
+          <a:p>
+            <a:pPr>
+              <a:lnSpc>
+                <a:spcPct val="100000"/>
+              </a:lnSpc>
+            </a:pPr>
+            <a:endParaRPr/>
+          </a:p>
+          <a:p>
+            <a:pPr>
+              <a:lnSpc>
+                <a:spcPct val="100000"/>
+              </a:lnSpc>
+            </a:pPr>
+            <a:endParaRPr/>
+          </a:p>
+          <a:p>
+            <a:pPr>
+              <a:lnSpc>
+                <a:spcPct val="100000"/>
+              </a:lnSpc>
             </a:pPr>
             <a:endParaRPr/>
           </a:p>
@@ -4230,9 +4397,7 @@
         <p:cTn dur="indefinite" id="9" nodeType="tmRoot" restart="never">
           <p:childTnLst>
             <p:seq>
-              <p:cTn id="10" nodeType="mainSeq">
-                <p:childTnLst/>
-              </p:cTn>
+              <p:cTn id="10" nodeType="mainSeq"/>
               <p:prevCondLst>
                 <p:cond delay="0" evt="onPrev">
                   <p:tgtEl>

</xml_diff>

<commit_message>
Corrected spelling, fixed output of StreamDemo.
</commit_message>
<xml_diff>
--- a/slides/Java 8 - Lambda Intro + Functional Interfaces.pptx
+++ b/slides/Java 8 - Lambda Intro + Functional Interfaces.pptx
@@ -2372,7 +2372,7 @@
         <p:spPr>
           <a:xfrm>
             <a:off x="9720" y="5356440"/>
-            <a:ext cx="9142560" cy="1458720"/>
+            <a:ext cx="9142200" cy="1458360"/>
           </a:xfrm>
           <a:prstGeom prst="rect">
             <a:avLst/>
@@ -2397,7 +2397,7 @@
         <p:spPr>
           <a:xfrm>
             <a:off x="7742160" y="6368760"/>
-            <a:ext cx="1176840" cy="253800"/>
+            <a:ext cx="1176480" cy="253440"/>
           </a:xfrm>
           <a:prstGeom prst="rect">
             <a:avLst/>
@@ -2422,7 +2422,7 @@
         <p:spPr>
           <a:xfrm>
             <a:off x="1153440" y="2393640"/>
-            <a:ext cx="2003400" cy="1991880"/>
+            <a:ext cx="2003040" cy="1991520"/>
           </a:xfrm>
           <a:prstGeom prst="rect">
             <a:avLst/>
@@ -2695,7 +2695,7 @@
         <p:spPr>
           <a:xfrm>
             <a:off x="9720" y="5356440"/>
-            <a:ext cx="9142560" cy="1458720"/>
+            <a:ext cx="9142200" cy="1458360"/>
           </a:xfrm>
           <a:prstGeom prst="rect">
             <a:avLst/>
@@ -2720,7 +2720,7 @@
         <p:spPr>
           <a:xfrm>
             <a:off x="7742160" y="6368760"/>
-            <a:ext cx="1176840" cy="253800"/>
+            <a:ext cx="1176480" cy="253440"/>
           </a:xfrm>
           <a:prstGeom prst="rect">
             <a:avLst/>
@@ -2914,7 +2914,7 @@
         <p:spPr>
           <a:xfrm>
             <a:off x="2517120" y="1213920"/>
-            <a:ext cx="6270120" cy="732600"/>
+            <a:ext cx="6269760" cy="732240"/>
           </a:xfrm>
           <a:prstGeom prst="rect">
             <a:avLst/>
@@ -2954,7 +2954,7 @@
         <p:spPr>
           <a:xfrm>
             <a:off x="0" y="1803240"/>
-            <a:ext cx="1364040" cy="220320"/>
+            <a:ext cx="1363680" cy="219960"/>
           </a:xfrm>
           <a:prstGeom prst="rect">
             <a:avLst/>
@@ -2994,7 +2994,7 @@
         <p:spPr>
           <a:xfrm>
             <a:off x="1110600" y="5019120"/>
-            <a:ext cx="932040" cy="255960"/>
+            <a:ext cx="931680" cy="255600"/>
           </a:xfrm>
           <a:prstGeom prst="rect">
             <a:avLst/>
@@ -3034,7 +3034,7 @@
         <p:spPr>
           <a:xfrm>
             <a:off x="3255840" y="4416480"/>
-            <a:ext cx="1223280" cy="255960"/>
+            <a:ext cx="1222920" cy="255600"/>
           </a:xfrm>
           <a:prstGeom prst="rect">
             <a:avLst/>
@@ -3074,7 +3074,7 @@
         <p:spPr>
           <a:xfrm>
             <a:off x="3695760" y="1931760"/>
-            <a:ext cx="5091840" cy="842040"/>
+            <a:ext cx="5091480" cy="841680"/>
           </a:xfrm>
           <a:prstGeom prst="rect">
             <a:avLst/>
@@ -3180,7 +3180,7 @@
         <p:spPr>
           <a:xfrm>
             <a:off x="497160" y="57960"/>
-            <a:ext cx="7820640" cy="1161000"/>
+            <a:ext cx="7820280" cy="1160640"/>
           </a:xfrm>
           <a:prstGeom prst="rect">
             <a:avLst/>
@@ -3220,7 +3220,7 @@
         <p:spPr>
           <a:xfrm>
             <a:off x="871200" y="1626840"/>
-            <a:ext cx="7808760" cy="3664800"/>
+            <a:ext cx="7808400" cy="3664440"/>
           </a:xfrm>
           <a:prstGeom prst="rect">
             <a:avLst/>
@@ -3470,7 +3470,7 @@
         <p:spPr>
           <a:xfrm>
             <a:off x="497160" y="57960"/>
-            <a:ext cx="7820640" cy="1161000"/>
+            <a:ext cx="7820280" cy="1160640"/>
           </a:xfrm>
           <a:prstGeom prst="rect">
             <a:avLst/>
@@ -3510,7 +3510,7 @@
         <p:spPr>
           <a:xfrm>
             <a:off x="871200" y="1626840"/>
-            <a:ext cx="7808760" cy="3664800"/>
+            <a:ext cx="7808400" cy="3664440"/>
           </a:xfrm>
           <a:prstGeom prst="rect">
             <a:avLst/>
@@ -3786,7 +3786,7 @@
         <p:spPr>
           <a:xfrm>
             <a:off x="497160" y="57960"/>
-            <a:ext cx="7820640" cy="1161000"/>
+            <a:ext cx="7820280" cy="1160640"/>
           </a:xfrm>
           <a:prstGeom prst="rect">
             <a:avLst/>
@@ -3821,7 +3821,7 @@
         <p:spPr>
           <a:xfrm>
             <a:off x="871200" y="1626840"/>
-            <a:ext cx="7808760" cy="3664800"/>
+            <a:ext cx="7808400" cy="3664440"/>
           </a:xfrm>
           <a:prstGeom prst="rect">
             <a:avLst/>
@@ -3995,8 +3995,6 @@
               <a:lnSpc>
                 <a:spcPct val="100000"/>
               </a:lnSpc>
-              <a:buFont typeface="Arial"/>
-              <a:buChar char="•"/>
             </a:pPr>
             <a:endParaRPr/>
           </a:p>
@@ -4094,7 +4092,7 @@
         <p:spPr>
           <a:xfrm>
             <a:off x="497160" y="57960"/>
-            <a:ext cx="7820640" cy="1161000"/>
+            <a:ext cx="7820280" cy="1160640"/>
           </a:xfrm>
           <a:prstGeom prst="rect">
             <a:avLst/>
@@ -4119,7 +4117,7 @@
                 </a:solidFill>
                 <a:latin typeface="Lucida Bright"/>
               </a:rPr>
-              <a:t>Funktional interface</a:t>
+              <a:t>Functional interfaces</a:t>
             </a:r>
             <a:endParaRPr/>
           </a:p>
@@ -4134,7 +4132,7 @@
         <p:spPr>
           <a:xfrm>
             <a:off x="871200" y="1188720"/>
-            <a:ext cx="7808760" cy="4102920"/>
+            <a:ext cx="7808400" cy="4102560"/>
           </a:xfrm>
           <a:prstGeom prst="rect">
             <a:avLst/>
@@ -4316,8 +4314,6 @@
               <a:lnSpc>
                 <a:spcPct val="100000"/>
               </a:lnSpc>
-              <a:buFont typeface="Arial"/>
-              <a:buChar char="•"/>
             </a:pPr>
             <a:endParaRPr/>
           </a:p>

</xml_diff>